<commit_message>
Teil der Präsentation von Christopher Pschibila hinzugefügt
</commit_message>
<xml_diff>
--- a/Präsentation/Statuspräsentation2.pptx
+++ b/Präsentation/Statuspräsentation2.pptx
@@ -5,11 +5,15 @@
     <p:sldMasterId id="2147483648" r:id="rId1"/>
   </p:sldMasterIdLst>
   <p:notesMasterIdLst>
-    <p:notesMasterId r:id="rId4"/>
+    <p:notesMasterId r:id="rId8"/>
   </p:notesMasterIdLst>
   <p:sldIdLst>
     <p:sldId id="256" r:id="rId2"/>
     <p:sldId id="260" r:id="rId3"/>
+    <p:sldId id="258" r:id="rId4"/>
+    <p:sldId id="261" r:id="rId5"/>
+    <p:sldId id="262" r:id="rId6"/>
+    <p:sldId id="263" r:id="rId7"/>
   </p:sldIdLst>
   <p:sldSz cx="12192000" cy="6858000"/>
   <p:notesSz cx="6858000" cy="9144000"/>
@@ -7696,6 +7700,913 @@
     <p:extLst>
       <p:ext uri="{BB962C8B-B14F-4D97-AF65-F5344CB8AC3E}">
         <p14:creationId xmlns:p14="http://schemas.microsoft.com/office/powerpoint/2010/main" val="837063793"/>
+      </p:ext>
+    </p:extLst>
+  </p:cSld>
+  <p:clrMapOvr>
+    <a:masterClrMapping/>
+  </p:clrMapOvr>
+</p:sld>
+</file>
+
+<file path=ppt/slides/slide3.xml><?xml version="1.0" encoding="utf-8"?>
+<p:sld xmlns:a="http://schemas.openxmlformats.org/drawingml/2006/main" xmlns:r="http://schemas.openxmlformats.org/officeDocument/2006/relationships" xmlns:p="http://schemas.openxmlformats.org/presentationml/2006/main">
+  <p:cSld>
+    <p:spTree>
+      <p:nvGrpSpPr>
+        <p:cNvPr id="1" name=""/>
+        <p:cNvGrpSpPr/>
+        <p:nvPr/>
+      </p:nvGrpSpPr>
+      <p:grpSpPr>
+        <a:xfrm>
+          <a:off x="0" y="0"/>
+          <a:ext cx="0" cy="0"/>
+          <a:chOff x="0" y="0"/>
+          <a:chExt cx="0" cy="0"/>
+        </a:xfrm>
+      </p:grpSpPr>
+      <p:sp>
+        <p:nvSpPr>
+          <p:cNvPr id="4" name="Titel 3">
+            <a:extLst>
+              <a:ext uri="{FF2B5EF4-FFF2-40B4-BE49-F238E27FC236}">
+                <a16:creationId xmlns:a16="http://schemas.microsoft.com/office/drawing/2014/main" id="{84C68109-468E-4320-A347-CD61565ABD8B}"/>
+              </a:ext>
+            </a:extLst>
+          </p:cNvPr>
+          <p:cNvSpPr>
+            <a:spLocks noGrp="1"/>
+          </p:cNvSpPr>
+          <p:nvPr>
+            <p:ph type="title"/>
+          </p:nvPr>
+        </p:nvSpPr>
+        <p:spPr>
+          <a:xfrm>
+            <a:off x="684212" y="4411744"/>
+            <a:ext cx="8534400" cy="714656"/>
+          </a:xfrm>
+        </p:spPr>
+        <p:txBody>
+          <a:bodyPr/>
+          <a:lstStyle/>
+          <a:p>
+            <a:r>
+              <a:rPr lang="de-DE" dirty="0"/>
+              <a:t>User Experience</a:t>
+            </a:r>
+          </a:p>
+        </p:txBody>
+      </p:sp>
+      <p:sp>
+        <p:nvSpPr>
+          <p:cNvPr id="5" name="Textplatzhalter 4">
+            <a:extLst>
+              <a:ext uri="{FF2B5EF4-FFF2-40B4-BE49-F238E27FC236}">
+                <a16:creationId xmlns:a16="http://schemas.microsoft.com/office/drawing/2014/main" id="{E127A5F6-278C-46F5-B682-739817FF04BE}"/>
+              </a:ext>
+            </a:extLst>
+          </p:cNvPr>
+          <p:cNvSpPr>
+            <a:spLocks noGrp="1"/>
+          </p:cNvSpPr>
+          <p:nvPr>
+            <p:ph type="body" idx="1"/>
+          </p:nvPr>
+        </p:nvSpPr>
+        <p:spPr/>
+        <p:txBody>
+          <a:bodyPr/>
+          <a:lstStyle/>
+          <a:p>
+            <a:r>
+              <a:rPr lang="de-DE" b="1" dirty="0"/>
+              <a:t>Christopher Pschibila / UX-Manager</a:t>
+            </a:r>
+          </a:p>
+          <a:p>
+            <a:endParaRPr lang="de-DE" dirty="0"/>
+          </a:p>
+        </p:txBody>
+      </p:sp>
+      <p:sp>
+        <p:nvSpPr>
+          <p:cNvPr id="2" name="Fußzeilenplatzhalter 1">
+            <a:extLst>
+              <a:ext uri="{FF2B5EF4-FFF2-40B4-BE49-F238E27FC236}">
+                <a16:creationId xmlns:a16="http://schemas.microsoft.com/office/drawing/2014/main" id="{E7E1272E-DBA6-4C09-A303-DD0B15BECA8F}"/>
+              </a:ext>
+            </a:extLst>
+          </p:cNvPr>
+          <p:cNvSpPr>
+            <a:spLocks noGrp="1"/>
+          </p:cNvSpPr>
+          <p:nvPr>
+            <p:ph type="ftr" sz="quarter" idx="11"/>
+          </p:nvPr>
+        </p:nvSpPr>
+        <p:spPr/>
+        <p:txBody>
+          <a:bodyPr/>
+          <a:lstStyle/>
+          <a:p>
+            <a:r>
+              <a:rPr lang="en-US"/>
+              <a:t>KA-Share</a:t>
+            </a:r>
+            <a:endParaRPr lang="en-US" dirty="0"/>
+          </a:p>
+        </p:txBody>
+      </p:sp>
+      <p:sp>
+        <p:nvSpPr>
+          <p:cNvPr id="3" name="Datumsplatzhalter 2">
+            <a:extLst>
+              <a:ext uri="{FF2B5EF4-FFF2-40B4-BE49-F238E27FC236}">
+                <a16:creationId xmlns:a16="http://schemas.microsoft.com/office/drawing/2014/main" id="{2DFD3153-86A9-4D4B-A1DF-7A2F6F0BA133}"/>
+              </a:ext>
+            </a:extLst>
+          </p:cNvPr>
+          <p:cNvSpPr>
+            <a:spLocks noGrp="1"/>
+          </p:cNvSpPr>
+          <p:nvPr>
+            <p:ph type="dt" sz="half" idx="10"/>
+          </p:nvPr>
+        </p:nvSpPr>
+        <p:spPr/>
+        <p:txBody>
+          <a:bodyPr/>
+          <a:lstStyle/>
+          <a:p>
+            <a:r>
+              <a:rPr lang="de-DE" dirty="0"/>
+              <a:t>18.03.2019</a:t>
+            </a:r>
+            <a:endParaRPr lang="en-US" dirty="0"/>
+          </a:p>
+        </p:txBody>
+      </p:sp>
+      <p:pic>
+        <p:nvPicPr>
+          <p:cNvPr id="6" name="Grafik 5" descr="Auto">
+            <a:extLst>
+              <a:ext uri="{FF2B5EF4-FFF2-40B4-BE49-F238E27FC236}">
+                <a16:creationId xmlns:a16="http://schemas.microsoft.com/office/drawing/2014/main" id="{BB1CAF7E-22C8-4388-9AE5-9DB1D0690E8D}"/>
+              </a:ext>
+            </a:extLst>
+          </p:cNvPr>
+          <p:cNvPicPr>
+            <a:picLocks noChangeAspect="1"/>
+          </p:cNvPicPr>
+          <p:nvPr/>
+        </p:nvPicPr>
+        <p:blipFill>
+          <a:blip r:embed="rId2">
+            <a:extLst>
+              <a:ext uri="{96DAC541-7B7A-43D3-8B79-37D633B846F1}">
+                <asvg:svgBlip xmlns:asvg="http://schemas.microsoft.com/office/drawing/2016/SVG/main" r:embed="rId3"/>
+              </a:ext>
+            </a:extLst>
+          </a:blip>
+          <a:stretch>
+            <a:fillRect/>
+          </a:stretch>
+        </p:blipFill>
+        <p:spPr>
+          <a:xfrm rot="18952507">
+            <a:off x="10890173" y="2415118"/>
+            <a:ext cx="1228875" cy="1228875"/>
+          </a:xfrm>
+          <a:prstGeom prst="rect">
+            <a:avLst/>
+          </a:prstGeom>
+        </p:spPr>
+      </p:pic>
+      <p:sp>
+        <p:nvSpPr>
+          <p:cNvPr id="7" name="Foliennummernplatzhalter 6">
+            <a:extLst>
+              <a:ext uri="{FF2B5EF4-FFF2-40B4-BE49-F238E27FC236}">
+                <a16:creationId xmlns:a16="http://schemas.microsoft.com/office/drawing/2014/main" id="{34ED39B3-FC6D-4359-BCAC-59F383486987}"/>
+              </a:ext>
+            </a:extLst>
+          </p:cNvPr>
+          <p:cNvSpPr>
+            <a:spLocks noGrp="1"/>
+          </p:cNvSpPr>
+          <p:nvPr>
+            <p:ph type="sldNum" sz="quarter" idx="12"/>
+          </p:nvPr>
+        </p:nvSpPr>
+        <p:spPr/>
+        <p:txBody>
+          <a:bodyPr/>
+          <a:lstStyle/>
+          <a:p>
+            <a:fld id="{D57F1E4F-1CFF-5643-939E-217C01CDF565}" type="slidenum">
+              <a:rPr lang="en-US" smtClean="0"/>
+              <a:pPr/>
+              <a:t>3</a:t>
+            </a:fld>
+            <a:endParaRPr lang="en-US" dirty="0"/>
+          </a:p>
+        </p:txBody>
+      </p:sp>
+      <p:sp>
+        <p:nvSpPr>
+          <p:cNvPr id="8" name="Titel 3">
+            <a:extLst>
+              <a:ext uri="{FF2B5EF4-FFF2-40B4-BE49-F238E27FC236}">
+                <a16:creationId xmlns:a16="http://schemas.microsoft.com/office/drawing/2014/main" id="{CC9F845A-93E8-4B2B-ADEF-BED8801FF075}"/>
+              </a:ext>
+            </a:extLst>
+          </p:cNvPr>
+          <p:cNvSpPr txBox="1">
+            <a:spLocks/>
+          </p:cNvSpPr>
+          <p:nvPr/>
+        </p:nvSpPr>
+        <p:spPr>
+          <a:xfrm>
+            <a:off x="749614" y="1132787"/>
+            <a:ext cx="9212361" cy="2296214"/>
+          </a:xfrm>
+          <a:prstGeom prst="rect">
+            <a:avLst/>
+          </a:prstGeom>
+          <a:effectLst/>
+        </p:spPr>
+        <p:txBody>
+          <a:bodyPr vert="horz" lIns="91440" tIns="45720" rIns="91440" bIns="45720" rtlCol="0" anchor="b">
+            <a:normAutofit/>
+          </a:bodyPr>
+          <a:lstStyle>
+            <a:lvl1pPr algn="l" defTabSz="457200" rtl="0" eaLnBrk="1" latinLnBrk="0" hangingPunct="1">
+              <a:spcBef>
+                <a:spcPct val="0"/>
+              </a:spcBef>
+              <a:buNone/>
+              <a:defRPr sz="3200" b="0" kern="1200" cap="all">
+                <a:ln w="3175" cmpd="sng">
+                  <a:noFill/>
+                </a:ln>
+                <a:solidFill>
+                  <a:schemeClr val="tx1"/>
+                </a:solidFill>
+                <a:effectLst/>
+                <a:latin typeface="+mj-lt"/>
+                <a:ea typeface="+mj-ea"/>
+                <a:cs typeface="+mj-cs"/>
+              </a:defRPr>
+            </a:lvl1pPr>
+            <a:lvl2pPr eaLnBrk="1" hangingPunct="1">
+              <a:defRPr>
+                <a:solidFill>
+                  <a:schemeClr val="tx2"/>
+                </a:solidFill>
+              </a:defRPr>
+            </a:lvl2pPr>
+            <a:lvl3pPr eaLnBrk="1" hangingPunct="1">
+              <a:defRPr>
+                <a:solidFill>
+                  <a:schemeClr val="tx2"/>
+                </a:solidFill>
+              </a:defRPr>
+            </a:lvl3pPr>
+            <a:lvl4pPr eaLnBrk="1" hangingPunct="1">
+              <a:defRPr>
+                <a:solidFill>
+                  <a:schemeClr val="tx2"/>
+                </a:solidFill>
+              </a:defRPr>
+            </a:lvl4pPr>
+            <a:lvl5pPr eaLnBrk="1" hangingPunct="1">
+              <a:defRPr>
+                <a:solidFill>
+                  <a:schemeClr val="tx2"/>
+                </a:solidFill>
+              </a:defRPr>
+            </a:lvl5pPr>
+            <a:lvl6pPr eaLnBrk="1" hangingPunct="1">
+              <a:defRPr>
+                <a:solidFill>
+                  <a:schemeClr val="tx2"/>
+                </a:solidFill>
+              </a:defRPr>
+            </a:lvl6pPr>
+            <a:lvl7pPr eaLnBrk="1" hangingPunct="1">
+              <a:defRPr>
+                <a:solidFill>
+                  <a:schemeClr val="tx2"/>
+                </a:solidFill>
+              </a:defRPr>
+            </a:lvl7pPr>
+            <a:lvl8pPr eaLnBrk="1" hangingPunct="1">
+              <a:defRPr>
+                <a:solidFill>
+                  <a:schemeClr val="tx2"/>
+                </a:solidFill>
+              </a:defRPr>
+            </a:lvl8pPr>
+            <a:lvl9pPr eaLnBrk="1" hangingPunct="1">
+              <a:defRPr>
+                <a:solidFill>
+                  <a:schemeClr val="tx2"/>
+                </a:solidFill>
+              </a:defRPr>
+            </a:lvl9pPr>
+          </a:lstStyle>
+          <a:p>
+            <a:r>
+              <a:rPr lang="de-DE" cap="none" dirty="0"/>
+              <a:t>Hauptaugenmerk:</a:t>
+            </a:r>
+          </a:p>
+          <a:p>
+            <a:endParaRPr lang="de-DE" cap="none" dirty="0"/>
+          </a:p>
+          <a:p>
+            <a:pPr marL="457200" indent="-457200">
+              <a:buFont typeface="Arial" panose="020B0604020202020204" pitchFamily="34" charset="0"/>
+              <a:buChar char="•"/>
+            </a:pPr>
+            <a:r>
+              <a:rPr lang="de-DE" cap="none" dirty="0"/>
+              <a:t>Usability (einfache Bedienbarkeit)</a:t>
+            </a:r>
+          </a:p>
+          <a:p>
+            <a:pPr marL="457200" indent="-457200">
+              <a:buFont typeface="Arial" panose="020B0604020202020204" pitchFamily="34" charset="0"/>
+              <a:buChar char="•"/>
+            </a:pPr>
+            <a:r>
+              <a:rPr lang="de-DE" cap="none" dirty="0"/>
+              <a:t>Look &amp; </a:t>
+            </a:r>
+            <a:r>
+              <a:rPr lang="de-DE" cap="none" dirty="0" err="1"/>
+              <a:t>Feel</a:t>
+            </a:r>
+            <a:endParaRPr lang="de-DE" cap="none" dirty="0"/>
+          </a:p>
+        </p:txBody>
+      </p:sp>
+    </p:spTree>
+    <p:extLst>
+      <p:ext uri="{BB962C8B-B14F-4D97-AF65-F5344CB8AC3E}">
+        <p14:creationId xmlns:p14="http://schemas.microsoft.com/office/powerpoint/2010/main" val="1795233669"/>
+      </p:ext>
+    </p:extLst>
+  </p:cSld>
+  <p:clrMapOvr>
+    <a:masterClrMapping/>
+  </p:clrMapOvr>
+</p:sld>
+</file>
+
+<file path=ppt/slides/slide4.xml><?xml version="1.0" encoding="utf-8"?>
+<p:sld xmlns:a="http://schemas.openxmlformats.org/drawingml/2006/main" xmlns:r="http://schemas.openxmlformats.org/officeDocument/2006/relationships" xmlns:p="http://schemas.openxmlformats.org/presentationml/2006/main">
+  <p:cSld>
+    <p:spTree>
+      <p:nvGrpSpPr>
+        <p:cNvPr id="1" name=""/>
+        <p:cNvGrpSpPr/>
+        <p:nvPr/>
+      </p:nvGrpSpPr>
+      <p:grpSpPr>
+        <a:xfrm>
+          <a:off x="0" y="0"/>
+          <a:ext cx="0" cy="0"/>
+          <a:chOff x="0" y="0"/>
+          <a:chExt cx="0" cy="0"/>
+        </a:xfrm>
+      </p:grpSpPr>
+      <p:sp>
+        <p:nvSpPr>
+          <p:cNvPr id="2" name="Fußzeilenplatzhalter 1">
+            <a:extLst>
+              <a:ext uri="{FF2B5EF4-FFF2-40B4-BE49-F238E27FC236}">
+                <a16:creationId xmlns:a16="http://schemas.microsoft.com/office/drawing/2014/main" id="{E7E1272E-DBA6-4C09-A303-DD0B15BECA8F}"/>
+              </a:ext>
+            </a:extLst>
+          </p:cNvPr>
+          <p:cNvSpPr>
+            <a:spLocks noGrp="1"/>
+          </p:cNvSpPr>
+          <p:nvPr>
+            <p:ph type="ftr" sz="quarter" idx="11"/>
+          </p:nvPr>
+        </p:nvSpPr>
+        <p:spPr/>
+        <p:txBody>
+          <a:bodyPr/>
+          <a:lstStyle/>
+          <a:p>
+            <a:r>
+              <a:rPr lang="en-US"/>
+              <a:t>KA-Share</a:t>
+            </a:r>
+            <a:endParaRPr lang="en-US" dirty="0"/>
+          </a:p>
+        </p:txBody>
+      </p:sp>
+      <p:sp>
+        <p:nvSpPr>
+          <p:cNvPr id="3" name="Datumsplatzhalter 2">
+            <a:extLst>
+              <a:ext uri="{FF2B5EF4-FFF2-40B4-BE49-F238E27FC236}">
+                <a16:creationId xmlns:a16="http://schemas.microsoft.com/office/drawing/2014/main" id="{2DFD3153-86A9-4D4B-A1DF-7A2F6F0BA133}"/>
+              </a:ext>
+            </a:extLst>
+          </p:cNvPr>
+          <p:cNvSpPr>
+            <a:spLocks noGrp="1"/>
+          </p:cNvSpPr>
+          <p:nvPr>
+            <p:ph type="dt" sz="half" idx="10"/>
+          </p:nvPr>
+        </p:nvSpPr>
+        <p:spPr/>
+        <p:txBody>
+          <a:bodyPr/>
+          <a:lstStyle/>
+          <a:p>
+            <a:r>
+              <a:rPr lang="de-DE" dirty="0"/>
+              <a:t>18.03.2019</a:t>
+            </a:r>
+            <a:endParaRPr lang="en-US" dirty="0"/>
+          </a:p>
+        </p:txBody>
+      </p:sp>
+      <p:pic>
+        <p:nvPicPr>
+          <p:cNvPr id="6" name="Grafik 5" descr="Auto">
+            <a:extLst>
+              <a:ext uri="{FF2B5EF4-FFF2-40B4-BE49-F238E27FC236}">
+                <a16:creationId xmlns:a16="http://schemas.microsoft.com/office/drawing/2014/main" id="{BB1CAF7E-22C8-4388-9AE5-9DB1D0690E8D}"/>
+              </a:ext>
+            </a:extLst>
+          </p:cNvPr>
+          <p:cNvPicPr>
+            <a:picLocks noChangeAspect="1"/>
+          </p:cNvPicPr>
+          <p:nvPr/>
+        </p:nvPicPr>
+        <p:blipFill>
+          <a:blip r:embed="rId2">
+            <a:extLst>
+              <a:ext uri="{96DAC541-7B7A-43D3-8B79-37D633B846F1}">
+                <asvg:svgBlip xmlns:asvg="http://schemas.microsoft.com/office/drawing/2016/SVG/main" r:embed="rId3"/>
+              </a:ext>
+            </a:extLst>
+          </a:blip>
+          <a:stretch>
+            <a:fillRect/>
+          </a:stretch>
+        </p:blipFill>
+        <p:spPr>
+          <a:xfrm rot="18952507">
+            <a:off x="10890173" y="2415118"/>
+            <a:ext cx="1228875" cy="1228875"/>
+          </a:xfrm>
+          <a:prstGeom prst="rect">
+            <a:avLst/>
+          </a:prstGeom>
+        </p:spPr>
+      </p:pic>
+      <p:sp>
+        <p:nvSpPr>
+          <p:cNvPr id="7" name="Foliennummernplatzhalter 6">
+            <a:extLst>
+              <a:ext uri="{FF2B5EF4-FFF2-40B4-BE49-F238E27FC236}">
+                <a16:creationId xmlns:a16="http://schemas.microsoft.com/office/drawing/2014/main" id="{34ED39B3-FC6D-4359-BCAC-59F383486987}"/>
+              </a:ext>
+            </a:extLst>
+          </p:cNvPr>
+          <p:cNvSpPr>
+            <a:spLocks noGrp="1"/>
+          </p:cNvSpPr>
+          <p:nvPr>
+            <p:ph type="sldNum" sz="quarter" idx="12"/>
+          </p:nvPr>
+        </p:nvSpPr>
+        <p:spPr/>
+        <p:txBody>
+          <a:bodyPr/>
+          <a:lstStyle/>
+          <a:p>
+            <a:fld id="{D57F1E4F-1CFF-5643-939E-217C01CDF565}" type="slidenum">
+              <a:rPr lang="en-US" smtClean="0"/>
+              <a:pPr/>
+              <a:t>4</a:t>
+            </a:fld>
+            <a:endParaRPr lang="en-US" dirty="0"/>
+          </a:p>
+        </p:txBody>
+      </p:sp>
+      <p:pic>
+        <p:nvPicPr>
+          <p:cNvPr id="14" name="Grafik 13" descr="Ein Bild, das Screenshot enthält.&#10;&#10;Automatisch generierte Beschreibung">
+            <a:extLst>
+              <a:ext uri="{FF2B5EF4-FFF2-40B4-BE49-F238E27FC236}">
+                <a16:creationId xmlns:a16="http://schemas.microsoft.com/office/drawing/2014/main" id="{A53478C3-A282-42C8-BA55-0F3DEC55B4E1}"/>
+              </a:ext>
+            </a:extLst>
+          </p:cNvPr>
+          <p:cNvPicPr>
+            <a:picLocks noChangeAspect="1"/>
+          </p:cNvPicPr>
+          <p:nvPr/>
+        </p:nvPicPr>
+        <p:blipFill rotWithShape="1">
+          <a:blip r:embed="rId4"/>
+          <a:srcRect l="2658" t="1484" r="3269" b="2183"/>
+          <a:stretch/>
+        </p:blipFill>
+        <p:spPr>
+          <a:xfrm>
+            <a:off x="2257992" y="185457"/>
+            <a:ext cx="6531427" cy="6351868"/>
+          </a:xfrm>
+          <a:prstGeom prst="rect">
+            <a:avLst/>
+          </a:prstGeom>
+        </p:spPr>
+      </p:pic>
+    </p:spTree>
+    <p:extLst>
+      <p:ext uri="{BB962C8B-B14F-4D97-AF65-F5344CB8AC3E}">
+        <p14:creationId xmlns:p14="http://schemas.microsoft.com/office/powerpoint/2010/main" val="2507682026"/>
+      </p:ext>
+    </p:extLst>
+  </p:cSld>
+  <p:clrMapOvr>
+    <a:masterClrMapping/>
+  </p:clrMapOvr>
+</p:sld>
+</file>
+
+<file path=ppt/slides/slide5.xml><?xml version="1.0" encoding="utf-8"?>
+<p:sld xmlns:a="http://schemas.openxmlformats.org/drawingml/2006/main" xmlns:r="http://schemas.openxmlformats.org/officeDocument/2006/relationships" xmlns:p="http://schemas.openxmlformats.org/presentationml/2006/main">
+  <p:cSld>
+    <p:spTree>
+      <p:nvGrpSpPr>
+        <p:cNvPr id="1" name=""/>
+        <p:cNvGrpSpPr/>
+        <p:nvPr/>
+      </p:nvGrpSpPr>
+      <p:grpSpPr>
+        <a:xfrm>
+          <a:off x="0" y="0"/>
+          <a:ext cx="0" cy="0"/>
+          <a:chOff x="0" y="0"/>
+          <a:chExt cx="0" cy="0"/>
+        </a:xfrm>
+      </p:grpSpPr>
+      <p:sp>
+        <p:nvSpPr>
+          <p:cNvPr id="2" name="Fußzeilenplatzhalter 1">
+            <a:extLst>
+              <a:ext uri="{FF2B5EF4-FFF2-40B4-BE49-F238E27FC236}">
+                <a16:creationId xmlns:a16="http://schemas.microsoft.com/office/drawing/2014/main" id="{E7E1272E-DBA6-4C09-A303-DD0B15BECA8F}"/>
+              </a:ext>
+            </a:extLst>
+          </p:cNvPr>
+          <p:cNvSpPr>
+            <a:spLocks noGrp="1"/>
+          </p:cNvSpPr>
+          <p:nvPr>
+            <p:ph type="ftr" sz="quarter" idx="11"/>
+          </p:nvPr>
+        </p:nvSpPr>
+        <p:spPr/>
+        <p:txBody>
+          <a:bodyPr/>
+          <a:lstStyle/>
+          <a:p>
+            <a:r>
+              <a:rPr lang="en-US"/>
+              <a:t>KA-Share</a:t>
+            </a:r>
+            <a:endParaRPr lang="en-US" dirty="0"/>
+          </a:p>
+        </p:txBody>
+      </p:sp>
+      <p:sp>
+        <p:nvSpPr>
+          <p:cNvPr id="3" name="Datumsplatzhalter 2">
+            <a:extLst>
+              <a:ext uri="{FF2B5EF4-FFF2-40B4-BE49-F238E27FC236}">
+                <a16:creationId xmlns:a16="http://schemas.microsoft.com/office/drawing/2014/main" id="{2DFD3153-86A9-4D4B-A1DF-7A2F6F0BA133}"/>
+              </a:ext>
+            </a:extLst>
+          </p:cNvPr>
+          <p:cNvSpPr>
+            <a:spLocks noGrp="1"/>
+          </p:cNvSpPr>
+          <p:nvPr>
+            <p:ph type="dt" sz="half" idx="10"/>
+          </p:nvPr>
+        </p:nvSpPr>
+        <p:spPr/>
+        <p:txBody>
+          <a:bodyPr/>
+          <a:lstStyle/>
+          <a:p>
+            <a:r>
+              <a:rPr lang="de-DE" dirty="0"/>
+              <a:t>18.03.2019</a:t>
+            </a:r>
+            <a:endParaRPr lang="en-US" dirty="0"/>
+          </a:p>
+        </p:txBody>
+      </p:sp>
+      <p:pic>
+        <p:nvPicPr>
+          <p:cNvPr id="6" name="Grafik 5" descr="Auto">
+            <a:extLst>
+              <a:ext uri="{FF2B5EF4-FFF2-40B4-BE49-F238E27FC236}">
+                <a16:creationId xmlns:a16="http://schemas.microsoft.com/office/drawing/2014/main" id="{BB1CAF7E-22C8-4388-9AE5-9DB1D0690E8D}"/>
+              </a:ext>
+            </a:extLst>
+          </p:cNvPr>
+          <p:cNvPicPr>
+            <a:picLocks noChangeAspect="1"/>
+          </p:cNvPicPr>
+          <p:nvPr/>
+        </p:nvPicPr>
+        <p:blipFill>
+          <a:blip r:embed="rId2">
+            <a:extLst>
+              <a:ext uri="{96DAC541-7B7A-43D3-8B79-37D633B846F1}">
+                <asvg:svgBlip xmlns:asvg="http://schemas.microsoft.com/office/drawing/2016/SVG/main" r:embed="rId3"/>
+              </a:ext>
+            </a:extLst>
+          </a:blip>
+          <a:stretch>
+            <a:fillRect/>
+          </a:stretch>
+        </p:blipFill>
+        <p:spPr>
+          <a:xfrm rot="18952507">
+            <a:off x="10890173" y="2415118"/>
+            <a:ext cx="1228875" cy="1228875"/>
+          </a:xfrm>
+          <a:prstGeom prst="rect">
+            <a:avLst/>
+          </a:prstGeom>
+        </p:spPr>
+      </p:pic>
+      <p:sp>
+        <p:nvSpPr>
+          <p:cNvPr id="7" name="Foliennummernplatzhalter 6">
+            <a:extLst>
+              <a:ext uri="{FF2B5EF4-FFF2-40B4-BE49-F238E27FC236}">
+                <a16:creationId xmlns:a16="http://schemas.microsoft.com/office/drawing/2014/main" id="{34ED39B3-FC6D-4359-BCAC-59F383486987}"/>
+              </a:ext>
+            </a:extLst>
+          </p:cNvPr>
+          <p:cNvSpPr>
+            <a:spLocks noGrp="1"/>
+          </p:cNvSpPr>
+          <p:nvPr>
+            <p:ph type="sldNum" sz="quarter" idx="12"/>
+          </p:nvPr>
+        </p:nvSpPr>
+        <p:spPr/>
+        <p:txBody>
+          <a:bodyPr/>
+          <a:lstStyle/>
+          <a:p>
+            <a:fld id="{D57F1E4F-1CFF-5643-939E-217C01CDF565}" type="slidenum">
+              <a:rPr lang="en-US" smtClean="0"/>
+              <a:pPr/>
+              <a:t>5</a:t>
+            </a:fld>
+            <a:endParaRPr lang="en-US" dirty="0"/>
+          </a:p>
+        </p:txBody>
+      </p:sp>
+      <p:pic>
+        <p:nvPicPr>
+          <p:cNvPr id="5" name="Grafik 4" descr="Ein Bild, das Screenshot enthält.&#10;&#10;Automatisch generierte Beschreibung">
+            <a:extLst>
+              <a:ext uri="{FF2B5EF4-FFF2-40B4-BE49-F238E27FC236}">
+                <a16:creationId xmlns:a16="http://schemas.microsoft.com/office/drawing/2014/main" id="{DCAC21EE-AB99-4EBA-8E2F-8037B701F4A7}"/>
+              </a:ext>
+            </a:extLst>
+          </p:cNvPr>
+          <p:cNvPicPr>
+            <a:picLocks noChangeAspect="1"/>
+          </p:cNvPicPr>
+          <p:nvPr/>
+        </p:nvPicPr>
+        <p:blipFill rotWithShape="1">
+          <a:blip r:embed="rId4"/>
+          <a:srcRect l="27455" t="1270" r="29420"/>
+          <a:stretch/>
+        </p:blipFill>
+        <p:spPr>
+          <a:xfrm>
+            <a:off x="2696086" y="192235"/>
+            <a:ext cx="5655240" cy="6473530"/>
+          </a:xfrm>
+          <a:prstGeom prst="rect">
+            <a:avLst/>
+          </a:prstGeom>
+        </p:spPr>
+      </p:pic>
+    </p:spTree>
+    <p:extLst>
+      <p:ext uri="{BB962C8B-B14F-4D97-AF65-F5344CB8AC3E}">
+        <p14:creationId xmlns:p14="http://schemas.microsoft.com/office/powerpoint/2010/main" val="3073218577"/>
+      </p:ext>
+    </p:extLst>
+  </p:cSld>
+  <p:clrMapOvr>
+    <a:masterClrMapping/>
+  </p:clrMapOvr>
+</p:sld>
+</file>
+
+<file path=ppt/slides/slide6.xml><?xml version="1.0" encoding="utf-8"?>
+<p:sld xmlns:a="http://schemas.openxmlformats.org/drawingml/2006/main" xmlns:r="http://schemas.openxmlformats.org/officeDocument/2006/relationships" xmlns:p="http://schemas.openxmlformats.org/presentationml/2006/main">
+  <p:cSld>
+    <p:spTree>
+      <p:nvGrpSpPr>
+        <p:cNvPr id="1" name=""/>
+        <p:cNvGrpSpPr/>
+        <p:nvPr/>
+      </p:nvGrpSpPr>
+      <p:grpSpPr>
+        <a:xfrm>
+          <a:off x="0" y="0"/>
+          <a:ext cx="0" cy="0"/>
+          <a:chOff x="0" y="0"/>
+          <a:chExt cx="0" cy="0"/>
+        </a:xfrm>
+      </p:grpSpPr>
+      <p:sp>
+        <p:nvSpPr>
+          <p:cNvPr id="2" name="Fußzeilenplatzhalter 1">
+            <a:extLst>
+              <a:ext uri="{FF2B5EF4-FFF2-40B4-BE49-F238E27FC236}">
+                <a16:creationId xmlns:a16="http://schemas.microsoft.com/office/drawing/2014/main" id="{E7E1272E-DBA6-4C09-A303-DD0B15BECA8F}"/>
+              </a:ext>
+            </a:extLst>
+          </p:cNvPr>
+          <p:cNvSpPr>
+            <a:spLocks noGrp="1"/>
+          </p:cNvSpPr>
+          <p:nvPr>
+            <p:ph type="ftr" sz="quarter" idx="11"/>
+          </p:nvPr>
+        </p:nvSpPr>
+        <p:spPr/>
+        <p:txBody>
+          <a:bodyPr/>
+          <a:lstStyle/>
+          <a:p>
+            <a:r>
+              <a:rPr lang="en-US"/>
+              <a:t>KA-Share</a:t>
+            </a:r>
+            <a:endParaRPr lang="en-US" dirty="0"/>
+          </a:p>
+        </p:txBody>
+      </p:sp>
+      <p:sp>
+        <p:nvSpPr>
+          <p:cNvPr id="3" name="Datumsplatzhalter 2">
+            <a:extLst>
+              <a:ext uri="{FF2B5EF4-FFF2-40B4-BE49-F238E27FC236}">
+                <a16:creationId xmlns:a16="http://schemas.microsoft.com/office/drawing/2014/main" id="{2DFD3153-86A9-4D4B-A1DF-7A2F6F0BA133}"/>
+              </a:ext>
+            </a:extLst>
+          </p:cNvPr>
+          <p:cNvSpPr>
+            <a:spLocks noGrp="1"/>
+          </p:cNvSpPr>
+          <p:nvPr>
+            <p:ph type="dt" sz="half" idx="10"/>
+          </p:nvPr>
+        </p:nvSpPr>
+        <p:spPr/>
+        <p:txBody>
+          <a:bodyPr/>
+          <a:lstStyle/>
+          <a:p>
+            <a:r>
+              <a:rPr lang="de-DE" dirty="0"/>
+              <a:t>18.03.2019</a:t>
+            </a:r>
+            <a:endParaRPr lang="en-US" dirty="0"/>
+          </a:p>
+        </p:txBody>
+      </p:sp>
+      <p:pic>
+        <p:nvPicPr>
+          <p:cNvPr id="6" name="Grafik 5" descr="Auto">
+            <a:extLst>
+              <a:ext uri="{FF2B5EF4-FFF2-40B4-BE49-F238E27FC236}">
+                <a16:creationId xmlns:a16="http://schemas.microsoft.com/office/drawing/2014/main" id="{BB1CAF7E-22C8-4388-9AE5-9DB1D0690E8D}"/>
+              </a:ext>
+            </a:extLst>
+          </p:cNvPr>
+          <p:cNvPicPr>
+            <a:picLocks noChangeAspect="1"/>
+          </p:cNvPicPr>
+          <p:nvPr/>
+        </p:nvPicPr>
+        <p:blipFill>
+          <a:blip r:embed="rId2">
+            <a:extLst>
+              <a:ext uri="{96DAC541-7B7A-43D3-8B79-37D633B846F1}">
+                <asvg:svgBlip xmlns:asvg="http://schemas.microsoft.com/office/drawing/2016/SVG/main" r:embed="rId3"/>
+              </a:ext>
+            </a:extLst>
+          </a:blip>
+          <a:stretch>
+            <a:fillRect/>
+          </a:stretch>
+        </p:blipFill>
+        <p:spPr>
+          <a:xfrm rot="18952507">
+            <a:off x="10890173" y="2415118"/>
+            <a:ext cx="1228875" cy="1228875"/>
+          </a:xfrm>
+          <a:prstGeom prst="rect">
+            <a:avLst/>
+          </a:prstGeom>
+        </p:spPr>
+      </p:pic>
+      <p:sp>
+        <p:nvSpPr>
+          <p:cNvPr id="7" name="Foliennummernplatzhalter 6">
+            <a:extLst>
+              <a:ext uri="{FF2B5EF4-FFF2-40B4-BE49-F238E27FC236}">
+                <a16:creationId xmlns:a16="http://schemas.microsoft.com/office/drawing/2014/main" id="{34ED39B3-FC6D-4359-BCAC-59F383486987}"/>
+              </a:ext>
+            </a:extLst>
+          </p:cNvPr>
+          <p:cNvSpPr>
+            <a:spLocks noGrp="1"/>
+          </p:cNvSpPr>
+          <p:nvPr>
+            <p:ph type="sldNum" sz="quarter" idx="12"/>
+          </p:nvPr>
+        </p:nvSpPr>
+        <p:spPr/>
+        <p:txBody>
+          <a:bodyPr/>
+          <a:lstStyle/>
+          <a:p>
+            <a:fld id="{D57F1E4F-1CFF-5643-939E-217C01CDF565}" type="slidenum">
+              <a:rPr lang="en-US" smtClean="0"/>
+              <a:pPr/>
+              <a:t>6</a:t>
+            </a:fld>
+            <a:endParaRPr lang="en-US" dirty="0"/>
+          </a:p>
+        </p:txBody>
+      </p:sp>
+      <p:pic>
+        <p:nvPicPr>
+          <p:cNvPr id="5" name="Grafik 4">
+            <a:extLst>
+              <a:ext uri="{FF2B5EF4-FFF2-40B4-BE49-F238E27FC236}">
+                <a16:creationId xmlns:a16="http://schemas.microsoft.com/office/drawing/2014/main" id="{0BD3B5C6-9EDC-4C8A-83B0-3313CFE7C104}"/>
+              </a:ext>
+            </a:extLst>
+          </p:cNvPr>
+          <p:cNvPicPr>
+            <a:picLocks noChangeAspect="1"/>
+          </p:cNvPicPr>
+          <p:nvPr/>
+        </p:nvPicPr>
+        <p:blipFill rotWithShape="1">
+          <a:blip r:embed="rId4"/>
+          <a:srcRect l="31741" r="33304" b="19498"/>
+          <a:stretch/>
+        </p:blipFill>
+        <p:spPr>
+          <a:xfrm>
+            <a:off x="2729222" y="153595"/>
+            <a:ext cx="5688909" cy="6550809"/>
+          </a:xfrm>
+          <a:prstGeom prst="rect">
+            <a:avLst/>
+          </a:prstGeom>
+        </p:spPr>
+      </p:pic>
+    </p:spTree>
+    <p:extLst>
+      <p:ext uri="{BB962C8B-B14F-4D97-AF65-F5344CB8AC3E}">
+        <p14:creationId xmlns:p14="http://schemas.microsoft.com/office/powerpoint/2010/main" val="841117000"/>
       </p:ext>
     </p:extLst>
   </p:cSld>

</xml_diff>

<commit_message>
Präsentation 2 eine Folie hinzugefügt
</commit_message>
<xml_diff>
--- a/Präsentation/Statuspräsentation2.pptx
+++ b/Präsentation/Statuspräsentation2.pptx
@@ -5,7 +5,7 @@
     <p:sldMasterId id="2147483648" r:id="rId1"/>
   </p:sldMasterIdLst>
   <p:notesMasterIdLst>
-    <p:notesMasterId r:id="rId9"/>
+    <p:notesMasterId r:id="rId10"/>
   </p:notesMasterIdLst>
   <p:sldIdLst>
     <p:sldId id="256" r:id="rId2"/>
@@ -15,6 +15,7 @@
     <p:sldId id="261" r:id="rId6"/>
     <p:sldId id="262" r:id="rId7"/>
     <p:sldId id="263" r:id="rId8"/>
+    <p:sldId id="264" r:id="rId9"/>
   </p:sldIdLst>
   <p:sldSz cx="12192000" cy="6858000"/>
   <p:notesSz cx="6858000" cy="9144000"/>
@@ -203,7 +204,7 @@
           <a:p>
             <a:fld id="{D1AEE69C-A511-489D-9735-98F84310A8BC}" type="datetimeFigureOut">
               <a:rPr lang="de-DE" smtClean="0"/>
-              <a:t>17.03.2019</a:t>
+              <a:t>18.03.2019</a:t>
             </a:fld>
             <a:endParaRPr lang="de-DE"/>
           </a:p>
@@ -6182,7 +6183,7 @@
           <a:lstStyle/>
           <a:p>
             <a:r>
-              <a:rPr lang="de-DE"/>
+              <a:rPr lang="de-DE" dirty="0"/>
               <a:t>KA-Sharing</a:t>
             </a:r>
             <a:br>
@@ -9000,6 +9001,272 @@
     <p:extLst>
       <p:ext uri="{BB962C8B-B14F-4D97-AF65-F5344CB8AC3E}">
         <p14:creationId xmlns:p14="http://schemas.microsoft.com/office/powerpoint/2010/main" val="841117000"/>
+      </p:ext>
+    </p:extLst>
+  </p:cSld>
+  <p:clrMapOvr>
+    <a:masterClrMapping/>
+  </p:clrMapOvr>
+</p:sld>
+</file>
+
+<file path=ppt/slides/slide8.xml><?xml version="1.0" encoding="utf-8"?>
+<p:sld xmlns:a="http://schemas.openxmlformats.org/drawingml/2006/main" xmlns:r="http://schemas.openxmlformats.org/officeDocument/2006/relationships" xmlns:p="http://schemas.openxmlformats.org/presentationml/2006/main">
+  <p:cSld>
+    <p:spTree>
+      <p:nvGrpSpPr>
+        <p:cNvPr id="1" name=""/>
+        <p:cNvGrpSpPr/>
+        <p:nvPr/>
+      </p:nvGrpSpPr>
+      <p:grpSpPr>
+        <a:xfrm>
+          <a:off x="0" y="0"/>
+          <a:ext cx="0" cy="0"/>
+          <a:chOff x="0" y="0"/>
+          <a:chExt cx="0" cy="0"/>
+        </a:xfrm>
+      </p:grpSpPr>
+      <p:sp>
+        <p:nvSpPr>
+          <p:cNvPr id="2" name="Fußzeilenplatzhalter 1">
+            <a:extLst>
+              <a:ext uri="{FF2B5EF4-FFF2-40B4-BE49-F238E27FC236}">
+                <a16:creationId xmlns:a16="http://schemas.microsoft.com/office/drawing/2014/main" id="{E7E1272E-DBA6-4C09-A303-DD0B15BECA8F}"/>
+              </a:ext>
+            </a:extLst>
+          </p:cNvPr>
+          <p:cNvSpPr>
+            <a:spLocks noGrp="1"/>
+          </p:cNvSpPr>
+          <p:nvPr>
+            <p:ph type="ftr" sz="quarter" idx="11"/>
+          </p:nvPr>
+        </p:nvSpPr>
+        <p:spPr/>
+        <p:txBody>
+          <a:bodyPr/>
+          <a:lstStyle/>
+          <a:p>
+            <a:r>
+              <a:rPr lang="en-US"/>
+              <a:t>KA-Share</a:t>
+            </a:r>
+            <a:endParaRPr lang="en-US" dirty="0"/>
+          </a:p>
+        </p:txBody>
+      </p:sp>
+      <p:sp>
+        <p:nvSpPr>
+          <p:cNvPr id="3" name="Datumsplatzhalter 2">
+            <a:extLst>
+              <a:ext uri="{FF2B5EF4-FFF2-40B4-BE49-F238E27FC236}">
+                <a16:creationId xmlns:a16="http://schemas.microsoft.com/office/drawing/2014/main" id="{2DFD3153-86A9-4D4B-A1DF-7A2F6F0BA133}"/>
+              </a:ext>
+            </a:extLst>
+          </p:cNvPr>
+          <p:cNvSpPr>
+            <a:spLocks noGrp="1"/>
+          </p:cNvSpPr>
+          <p:nvPr>
+            <p:ph type="dt" sz="half" idx="10"/>
+          </p:nvPr>
+        </p:nvSpPr>
+        <p:spPr/>
+        <p:txBody>
+          <a:bodyPr/>
+          <a:lstStyle/>
+          <a:p>
+            <a:r>
+              <a:rPr lang="de-DE" dirty="0"/>
+              <a:t>18.03.2019</a:t>
+            </a:r>
+            <a:endParaRPr lang="en-US" dirty="0"/>
+          </a:p>
+        </p:txBody>
+      </p:sp>
+      <p:pic>
+        <p:nvPicPr>
+          <p:cNvPr id="6" name="Grafik 5" descr="Auto">
+            <a:extLst>
+              <a:ext uri="{FF2B5EF4-FFF2-40B4-BE49-F238E27FC236}">
+                <a16:creationId xmlns:a16="http://schemas.microsoft.com/office/drawing/2014/main" id="{BB1CAF7E-22C8-4388-9AE5-9DB1D0690E8D}"/>
+              </a:ext>
+            </a:extLst>
+          </p:cNvPr>
+          <p:cNvPicPr>
+            <a:picLocks noChangeAspect="1"/>
+          </p:cNvPicPr>
+          <p:nvPr/>
+        </p:nvPicPr>
+        <p:blipFill>
+          <a:blip r:embed="rId2">
+            <a:extLst>
+              <a:ext uri="{96DAC541-7B7A-43D3-8B79-37D633B846F1}">
+                <asvg:svgBlip xmlns:asvg="http://schemas.microsoft.com/office/drawing/2016/SVG/main" r:embed="rId3"/>
+              </a:ext>
+            </a:extLst>
+          </a:blip>
+          <a:stretch>
+            <a:fillRect/>
+          </a:stretch>
+        </p:blipFill>
+        <p:spPr>
+          <a:xfrm rot="18952507">
+            <a:off x="10890173" y="2415118"/>
+            <a:ext cx="1228875" cy="1228875"/>
+          </a:xfrm>
+          <a:prstGeom prst="rect">
+            <a:avLst/>
+          </a:prstGeom>
+        </p:spPr>
+      </p:pic>
+      <p:sp>
+        <p:nvSpPr>
+          <p:cNvPr id="7" name="Foliennummernplatzhalter 6">
+            <a:extLst>
+              <a:ext uri="{FF2B5EF4-FFF2-40B4-BE49-F238E27FC236}">
+                <a16:creationId xmlns:a16="http://schemas.microsoft.com/office/drawing/2014/main" id="{34ED39B3-FC6D-4359-BCAC-59F383486987}"/>
+              </a:ext>
+            </a:extLst>
+          </p:cNvPr>
+          <p:cNvSpPr>
+            <a:spLocks noGrp="1"/>
+          </p:cNvSpPr>
+          <p:nvPr>
+            <p:ph type="sldNum" sz="quarter" idx="12"/>
+          </p:nvPr>
+        </p:nvSpPr>
+        <p:spPr/>
+        <p:txBody>
+          <a:bodyPr/>
+          <a:lstStyle/>
+          <a:p>
+            <a:fld id="{D57F1E4F-1CFF-5643-939E-217C01CDF565}" type="slidenum">
+              <a:rPr lang="en-US" smtClean="0"/>
+              <a:pPr/>
+              <a:t>8</a:t>
+            </a:fld>
+            <a:endParaRPr lang="en-US" dirty="0"/>
+          </a:p>
+        </p:txBody>
+      </p:sp>
+      <p:sp>
+        <p:nvSpPr>
+          <p:cNvPr id="8" name="Titel 1">
+            <a:extLst>
+              <a:ext uri="{FF2B5EF4-FFF2-40B4-BE49-F238E27FC236}">
+                <a16:creationId xmlns:a16="http://schemas.microsoft.com/office/drawing/2014/main" id="{C8176073-E419-4937-AE13-EE684378145D}"/>
+              </a:ext>
+            </a:extLst>
+          </p:cNvPr>
+          <p:cNvSpPr txBox="1">
+            <a:spLocks/>
+          </p:cNvSpPr>
+          <p:nvPr/>
+        </p:nvSpPr>
+        <p:spPr>
+          <a:xfrm>
+            <a:off x="2870851" y="1844299"/>
+            <a:ext cx="5715210" cy="1405233"/>
+          </a:xfrm>
+          <a:prstGeom prst="rect">
+            <a:avLst/>
+          </a:prstGeom>
+          <a:effectLst/>
+        </p:spPr>
+        <p:txBody>
+          <a:bodyPr vert="horz" lIns="91440" tIns="45720" rIns="91440" bIns="45720" rtlCol="0" anchor="b">
+            <a:normAutofit/>
+          </a:bodyPr>
+          <a:lstStyle>
+            <a:lvl1pPr algn="l" defTabSz="457200" rtl="0" eaLnBrk="1" latinLnBrk="0" hangingPunct="1">
+              <a:spcBef>
+                <a:spcPct val="0"/>
+              </a:spcBef>
+              <a:buNone/>
+              <a:defRPr sz="3200" b="0" kern="1200" cap="all">
+                <a:ln w="3175" cmpd="sng">
+                  <a:noFill/>
+                </a:ln>
+                <a:solidFill>
+                  <a:schemeClr val="tx1"/>
+                </a:solidFill>
+                <a:effectLst/>
+                <a:latin typeface="+mj-lt"/>
+                <a:ea typeface="+mj-ea"/>
+                <a:cs typeface="+mj-cs"/>
+              </a:defRPr>
+            </a:lvl1pPr>
+            <a:lvl2pPr eaLnBrk="1" hangingPunct="1">
+              <a:defRPr>
+                <a:solidFill>
+                  <a:schemeClr val="tx2"/>
+                </a:solidFill>
+              </a:defRPr>
+            </a:lvl2pPr>
+            <a:lvl3pPr eaLnBrk="1" hangingPunct="1">
+              <a:defRPr>
+                <a:solidFill>
+                  <a:schemeClr val="tx2"/>
+                </a:solidFill>
+              </a:defRPr>
+            </a:lvl3pPr>
+            <a:lvl4pPr eaLnBrk="1" hangingPunct="1">
+              <a:defRPr>
+                <a:solidFill>
+                  <a:schemeClr val="tx2"/>
+                </a:solidFill>
+              </a:defRPr>
+            </a:lvl4pPr>
+            <a:lvl5pPr eaLnBrk="1" hangingPunct="1">
+              <a:defRPr>
+                <a:solidFill>
+                  <a:schemeClr val="tx2"/>
+                </a:solidFill>
+              </a:defRPr>
+            </a:lvl5pPr>
+            <a:lvl6pPr eaLnBrk="1" hangingPunct="1">
+              <a:defRPr>
+                <a:solidFill>
+                  <a:schemeClr val="tx2"/>
+                </a:solidFill>
+              </a:defRPr>
+            </a:lvl6pPr>
+            <a:lvl7pPr eaLnBrk="1" hangingPunct="1">
+              <a:defRPr>
+                <a:solidFill>
+                  <a:schemeClr val="tx2"/>
+                </a:solidFill>
+              </a:defRPr>
+            </a:lvl7pPr>
+            <a:lvl8pPr eaLnBrk="1" hangingPunct="1">
+              <a:defRPr>
+                <a:solidFill>
+                  <a:schemeClr val="tx2"/>
+                </a:solidFill>
+              </a:defRPr>
+            </a:lvl8pPr>
+            <a:lvl9pPr eaLnBrk="1" hangingPunct="1">
+              <a:defRPr>
+                <a:solidFill>
+                  <a:schemeClr val="tx2"/>
+                </a:solidFill>
+              </a:defRPr>
+            </a:lvl9pPr>
+          </a:lstStyle>
+          <a:p>
+            <a:r>
+              <a:rPr lang="de-DE" sz="8000" dirty="0"/>
+              <a:t>Live Demo</a:t>
+            </a:r>
+          </a:p>
+        </p:txBody>
+      </p:sp>
+    </p:spTree>
+    <p:extLst>
+      <p:ext uri="{BB962C8B-B14F-4D97-AF65-F5344CB8AC3E}">
+        <p14:creationId xmlns:p14="http://schemas.microsoft.com/office/powerpoint/2010/main" val="314551817"/>
       </p:ext>
     </p:extLst>
   </p:cSld>

</xml_diff>